<commit_message>
chapter 4 - events
</commit_message>
<xml_diff>
--- a/Documents/Chapter 4/Delegates/Delegates.pptx
+++ b/Documents/Chapter 4/Delegates/Delegates.pptx
@@ -6184,7 +6184,7 @@
               <a:t>Chapter 4 - </a:t>
             </a:r>
             <a:r>
-              <a:rPr lang="en-US"/>
+              <a:rPr lang="en-US" dirty="0" err="1"/>
               <a:t>DelEgates</a:t>
             </a:r>
             <a:endParaRPr lang="en-US" dirty="0"/>
@@ -7234,11 +7234,18 @@
               <a:buNone/>
             </a:pPr>
             <a:r>
-              <a:rPr lang="fa-IR" cap="none" dirty="0">
-                <a:latin typeface="Tahoma" panose="020B0604030504040204" pitchFamily="34" charset="0"/>
-                <a:cs typeface="B Lotus" panose="00000400000000000000" pitchFamily="2" charset="-78"/>
-              </a:rPr>
-              <a:t>نها حالاتی که نمیشه با این دو </a:t>
+              <a:rPr lang="fa-IR" cap="none">
+                <a:latin typeface="Tahoma" panose="020B0604030504040204" pitchFamily="34" charset="0"/>
+                <a:cs typeface="B Lotus" panose="00000400000000000000" pitchFamily="2" charset="-78"/>
+              </a:rPr>
+              <a:t>تنها </a:t>
+            </a:r>
+            <a:r>
+              <a:rPr lang="fa-IR" cap="none" dirty="0">
+                <a:latin typeface="Tahoma" panose="020B0604030504040204" pitchFamily="34" charset="0"/>
+                <a:cs typeface="B Lotus" panose="00000400000000000000" pitchFamily="2" charset="-78"/>
+              </a:rPr>
+              <a:t>حالاتی که نمیشه با این دو </a:t>
             </a:r>
             <a:r>
               <a:rPr lang="en-US" cap="none" dirty="0">

</xml_diff>